<commit_message>
Working on project presentation script
</commit_message>
<xml_diff>
--- a/Presentation/Project Presentation.pptx
+++ b/Presentation/Project Presentation.pptx
@@ -374,7 +374,7 @@
           <a:p>
             <a:fld id="{12A3897E-C154-4A50-AC83-AB3B5078EDF1}" type="datetimeFigureOut">
               <a:rPr lang="en-GB" smtClean="0"/>
-              <a:t>05/04/2017</a:t>
+              <a:t>09/04/2017</a:t>
             </a:fld>
             <a:endParaRPr lang="en-GB"/>
           </a:p>
@@ -636,7 +636,7 @@
           <a:p>
             <a:fld id="{12A3897E-C154-4A50-AC83-AB3B5078EDF1}" type="datetimeFigureOut">
               <a:rPr lang="en-GB" smtClean="0"/>
-              <a:t>05/04/2017</a:t>
+              <a:t>09/04/2017</a:t>
             </a:fld>
             <a:endParaRPr lang="en-GB"/>
           </a:p>
@@ -871,7 +871,7 @@
           <a:p>
             <a:fld id="{12A3897E-C154-4A50-AC83-AB3B5078EDF1}" type="datetimeFigureOut">
               <a:rPr lang="en-GB" smtClean="0"/>
-              <a:t>05/04/2017</a:t>
+              <a:t>09/04/2017</a:t>
             </a:fld>
             <a:endParaRPr lang="en-GB"/>
           </a:p>
@@ -1111,7 +1111,7 @@
           <a:p>
             <a:fld id="{12A3897E-C154-4A50-AC83-AB3B5078EDF1}" type="datetimeFigureOut">
               <a:rPr lang="en-GB" smtClean="0"/>
-              <a:t>05/04/2017</a:t>
+              <a:t>09/04/2017</a:t>
             </a:fld>
             <a:endParaRPr lang="en-GB"/>
           </a:p>
@@ -1418,7 +1418,7 @@
           <a:p>
             <a:fld id="{12A3897E-C154-4A50-AC83-AB3B5078EDF1}" type="datetimeFigureOut">
               <a:rPr lang="en-GB" smtClean="0"/>
-              <a:t>05/04/2017</a:t>
+              <a:t>09/04/2017</a:t>
             </a:fld>
             <a:endParaRPr lang="en-GB"/>
           </a:p>
@@ -1720,7 +1720,7 @@
           <a:p>
             <a:fld id="{12A3897E-C154-4A50-AC83-AB3B5078EDF1}" type="datetimeFigureOut">
               <a:rPr lang="en-GB" smtClean="0"/>
-              <a:t>05/04/2017</a:t>
+              <a:t>09/04/2017</a:t>
             </a:fld>
             <a:endParaRPr lang="en-GB"/>
           </a:p>
@@ -2142,7 +2142,7 @@
           <a:p>
             <a:fld id="{12A3897E-C154-4A50-AC83-AB3B5078EDF1}" type="datetimeFigureOut">
               <a:rPr lang="en-GB" smtClean="0"/>
-              <a:t>05/04/2017</a:t>
+              <a:t>09/04/2017</a:t>
             </a:fld>
             <a:endParaRPr lang="en-GB"/>
           </a:p>
@@ -2237,7 +2237,7 @@
           <a:p>
             <a:fld id="{12A3897E-C154-4A50-AC83-AB3B5078EDF1}" type="datetimeFigureOut">
               <a:rPr lang="en-GB" smtClean="0"/>
-              <a:t>05/04/2017</a:t>
+              <a:t>09/04/2017</a:t>
             </a:fld>
             <a:endParaRPr lang="en-GB"/>
           </a:p>
@@ -2399,7 +2399,7 @@
           <a:p>
             <a:fld id="{12A3897E-C154-4A50-AC83-AB3B5078EDF1}" type="datetimeFigureOut">
               <a:rPr lang="en-GB" smtClean="0"/>
-              <a:t>05/04/2017</a:t>
+              <a:t>09/04/2017</a:t>
             </a:fld>
             <a:endParaRPr lang="en-GB"/>
           </a:p>
@@ -2777,7 +2777,7 @@
           <a:p>
             <a:fld id="{12A3897E-C154-4A50-AC83-AB3B5078EDF1}" type="datetimeFigureOut">
               <a:rPr lang="en-GB" smtClean="0"/>
-              <a:t>05/04/2017</a:t>
+              <a:t>09/04/2017</a:t>
             </a:fld>
             <a:endParaRPr lang="en-GB"/>
           </a:p>
@@ -3066,7 +3066,7 @@
           <a:p>
             <a:fld id="{12A3897E-C154-4A50-AC83-AB3B5078EDF1}" type="datetimeFigureOut">
               <a:rPr lang="en-GB" smtClean="0"/>
-              <a:t>05/04/2017</a:t>
+              <a:t>09/04/2017</a:t>
             </a:fld>
             <a:endParaRPr lang="en-GB"/>
           </a:p>
@@ -3277,7 +3277,7 @@
           <a:p>
             <a:fld id="{12A3897E-C154-4A50-AC83-AB3B5078EDF1}" type="datetimeFigureOut">
               <a:rPr lang="en-GB" smtClean="0"/>
-              <a:t>05/04/2017</a:t>
+              <a:t>09/04/2017</a:t>
             </a:fld>
             <a:endParaRPr lang="en-GB"/>
           </a:p>
@@ -3928,8 +3928,8 @@
               <a:t>Alistair </a:t>
             </a:r>
             <a:r>
-              <a:rPr lang="en-GB" dirty="0" err="1" smtClean="0"/>
-              <a:t>jewers</a:t>
+              <a:rPr lang="en-GB" dirty="0" smtClean="0"/>
+              <a:t>Jewers</a:t>
             </a:r>
             <a:endParaRPr lang="en-GB" dirty="0" smtClean="0"/>
           </a:p>
@@ -4178,16 +4178,8 @@
               <a:t>Supervisor – </a:t>
             </a:r>
             <a:r>
-              <a:rPr lang="en-GB" dirty="0" err="1" smtClean="0"/>
-              <a:t>alan</a:t>
-            </a:r>
-            <a:r>
-              <a:rPr lang="en-GB" dirty="0" smtClean="0"/>
-              <a:t> </a:t>
-            </a:r>
-            <a:r>
-              <a:rPr lang="en-GB" dirty="0" err="1" smtClean="0"/>
-              <a:t>millard</a:t>
+              <a:rPr lang="en-GB" dirty="0" smtClean="0"/>
+              <a:t>Alan Millard</a:t>
             </a:r>
             <a:endParaRPr lang="en-GB" dirty="0" smtClean="0"/>
           </a:p>
@@ -4517,17 +4509,8 @@
           <a:p>
             <a:r>
               <a:rPr lang="en-GB" dirty="0" smtClean="0"/>
-              <a:t>[</a:t>
-            </a:r>
-            <a:r>
-              <a:rPr lang="en-GB" dirty="0" smtClean="0"/>
-              <a:t>SCREENSHOTS OF ROBOT </a:t>
-            </a:r>
-            <a:r>
-              <a:rPr lang="en-GB" dirty="0" smtClean="0"/>
-              <a:t>TRACKING]</a:t>
-            </a:r>
-            <a:endParaRPr lang="en-GB" dirty="0" smtClean="0"/>
+              <a:t>[SCREENSHOTS OF ROBOT TRACKING]</a:t>
+            </a:r>
           </a:p>
           <a:p>
             <a:r>
@@ -4738,23 +4721,7 @@
           <a:p>
             <a:r>
               <a:rPr lang="en-GB" dirty="0" smtClean="0"/>
-              <a:t>[</a:t>
-            </a:r>
-            <a:r>
-              <a:rPr lang="en-GB" dirty="0" smtClean="0"/>
-              <a:t>SCREENSHOTS OF </a:t>
-            </a:r>
-            <a:r>
-              <a:rPr lang="en-GB" dirty="0" smtClean="0"/>
-              <a:t>EACH </a:t>
-            </a:r>
-            <a:r>
-              <a:rPr lang="en-GB" dirty="0" smtClean="0"/>
-              <a:t>DATA </a:t>
-            </a:r>
-            <a:r>
-              <a:rPr lang="en-GB" dirty="0" smtClean="0"/>
-              <a:t>TYPE</a:t>
+              <a:t>[SCREENSHOTS OF EACH DATA TYPE</a:t>
             </a:r>
             <a:r>
               <a:rPr lang="en-GB" dirty="0"/>
@@ -7001,8 +6968,25 @@
           <a:p>
             <a:r>
               <a:rPr lang="en-GB" dirty="0" smtClean="0"/>
-              <a:t>Augment the video feed with graphical representations of the retrieved data</a:t>
-            </a:r>
+              <a:t>Augment the video feed with graphical representations of the retrieved </a:t>
+            </a:r>
+            <a:r>
+              <a:rPr lang="en-GB" dirty="0" smtClean="0"/>
+              <a:t>data</a:t>
+            </a:r>
+          </a:p>
+          <a:p>
+            <a:r>
+              <a:rPr lang="en-GB" dirty="0" smtClean="0"/>
+              <a:t>[IMAGE : (raw video image) + (robot emitting data) </a:t>
+            </a:r>
+            <a:r>
+              <a:rPr lang="en-GB" dirty="0" smtClean="0">
+                <a:sym typeface="Wingdings" panose="05000000000000000000" pitchFamily="2" charset="2"/>
+              </a:rPr>
+              <a:t> (augmented video)</a:t>
+            </a:r>
+            <a:endParaRPr lang="en-GB" dirty="0" smtClean="0"/>
           </a:p>
         </p:txBody>
       </p:sp>
@@ -7201,15 +7185,27 @@
           <a:p>
             <a:r>
               <a:rPr lang="en-GB" dirty="0" smtClean="0"/>
-              <a:t>Practical work carried out at the York Robotics Laboratory, on </a:t>
+              <a:t>Practical work carried out at the York Robotics Laboratory</a:t>
+            </a:r>
+            <a:r>
+              <a:rPr lang="en-GB" smtClean="0"/>
+              <a:t>, </a:t>
+            </a:r>
+            <a:r>
+              <a:rPr lang="en-GB" smtClean="0"/>
+              <a:t>on </a:t>
             </a:r>
             <a:r>
               <a:rPr lang="en-GB" dirty="0" err="1" smtClean="0"/>
-              <a:t>Hes</a:t>
-            </a:r>
-            <a:r>
-              <a:rPr lang="en-GB" dirty="0" smtClean="0"/>
-              <a:t> East</a:t>
+              <a:t>Heslington</a:t>
+            </a:r>
+            <a:r>
+              <a:rPr lang="en-GB" dirty="0" smtClean="0"/>
+              <a:t> </a:t>
+            </a:r>
+            <a:r>
+              <a:rPr lang="en-GB" dirty="0" smtClean="0"/>
+              <a:t>East</a:t>
             </a:r>
           </a:p>
           <a:p>

</xml_diff>